<commit_message>
fix(i18n): update German images and remove outdated PNG files for ÖV-Güteklassen documentation
</commit_message>
<xml_diff>
--- a/apps/docs/static/img/toolbox/accessibility_indicators/gueteklassen/ÖV Güteklassen Docs.pptx
+++ b/apps/docs/static/img/toolbox/accessibility_indicators/gueteklassen/ÖV Güteklassen Docs.pptx
@@ -254,7 +254,7 @@
           <a:p>
             <a:fld id="{D3EB3054-B75A-4BD7-8B3E-8DC0F614FAF3}" type="datetimeFigureOut">
               <a:rPr lang="de-DE" smtClean="0"/>
-              <a:t>18.09.2022</a:t>
+              <a:t>30.07.25</a:t>
             </a:fld>
             <a:endParaRPr lang="de-DE"/>
           </a:p>
@@ -422,7 +422,7 @@
           <a:p>
             <a:fld id="{D3EB3054-B75A-4BD7-8B3E-8DC0F614FAF3}" type="datetimeFigureOut">
               <a:rPr lang="de-DE" smtClean="0"/>
-              <a:t>18.09.2022</a:t>
+              <a:t>30.07.25</a:t>
             </a:fld>
             <a:endParaRPr lang="de-DE"/>
           </a:p>
@@ -600,7 +600,7 @@
           <a:p>
             <a:fld id="{D3EB3054-B75A-4BD7-8B3E-8DC0F614FAF3}" type="datetimeFigureOut">
               <a:rPr lang="de-DE" smtClean="0"/>
-              <a:t>18.09.2022</a:t>
+              <a:t>30.07.25</a:t>
             </a:fld>
             <a:endParaRPr lang="de-DE"/>
           </a:p>
@@ -1834,7 +1834,7 @@
           <a:p>
             <a:fld id="{D3EB3054-B75A-4BD7-8B3E-8DC0F614FAF3}" type="datetimeFigureOut">
               <a:rPr lang="de-DE" smtClean="0"/>
-              <a:t>18.09.2022</a:t>
+              <a:t>30.07.25</a:t>
             </a:fld>
             <a:endParaRPr lang="de-DE"/>
           </a:p>
@@ -2079,7 +2079,7 @@
           <a:p>
             <a:fld id="{D3EB3054-B75A-4BD7-8B3E-8DC0F614FAF3}" type="datetimeFigureOut">
               <a:rPr lang="de-DE" smtClean="0"/>
-              <a:t>18.09.2022</a:t>
+              <a:t>30.07.25</a:t>
             </a:fld>
             <a:endParaRPr lang="de-DE"/>
           </a:p>
@@ -2308,7 +2308,7 @@
           <a:p>
             <a:fld id="{D3EB3054-B75A-4BD7-8B3E-8DC0F614FAF3}" type="datetimeFigureOut">
               <a:rPr lang="de-DE" smtClean="0"/>
-              <a:t>18.09.2022</a:t>
+              <a:t>30.07.25</a:t>
             </a:fld>
             <a:endParaRPr lang="de-DE"/>
           </a:p>
@@ -2672,7 +2672,7 @@
           <a:p>
             <a:fld id="{D3EB3054-B75A-4BD7-8B3E-8DC0F614FAF3}" type="datetimeFigureOut">
               <a:rPr lang="de-DE" smtClean="0"/>
-              <a:t>18.09.2022</a:t>
+              <a:t>30.07.25</a:t>
             </a:fld>
             <a:endParaRPr lang="de-DE"/>
           </a:p>
@@ -2789,7 +2789,7 @@
           <a:p>
             <a:fld id="{D3EB3054-B75A-4BD7-8B3E-8DC0F614FAF3}" type="datetimeFigureOut">
               <a:rPr lang="de-DE" smtClean="0"/>
-              <a:t>18.09.2022</a:t>
+              <a:t>30.07.25</a:t>
             </a:fld>
             <a:endParaRPr lang="de-DE"/>
           </a:p>
@@ -2884,7 +2884,7 @@
           <a:p>
             <a:fld id="{D3EB3054-B75A-4BD7-8B3E-8DC0F614FAF3}" type="datetimeFigureOut">
               <a:rPr lang="de-DE" smtClean="0"/>
-              <a:t>18.09.2022</a:t>
+              <a:t>30.07.25</a:t>
             </a:fld>
             <a:endParaRPr lang="de-DE"/>
           </a:p>
@@ -3159,7 +3159,7 @@
           <a:p>
             <a:fld id="{D3EB3054-B75A-4BD7-8B3E-8DC0F614FAF3}" type="datetimeFigureOut">
               <a:rPr lang="de-DE" smtClean="0"/>
-              <a:t>18.09.2022</a:t>
+              <a:t>30.07.25</a:t>
             </a:fld>
             <a:endParaRPr lang="de-DE"/>
           </a:p>
@@ -3411,7 +3411,7 @@
           <a:p>
             <a:fld id="{D3EB3054-B75A-4BD7-8B3E-8DC0F614FAF3}" type="datetimeFigureOut">
               <a:rPr lang="de-DE" smtClean="0"/>
-              <a:t>18.09.2022</a:t>
+              <a:t>30.07.25</a:t>
             </a:fld>
             <a:endParaRPr lang="de-DE"/>
           </a:p>
@@ -3622,7 +3622,7 @@
           <a:p>
             <a:fld id="{D3EB3054-B75A-4BD7-8B3E-8DC0F614FAF3}" type="datetimeFigureOut">
               <a:rPr lang="de-DE" smtClean="0"/>
-              <a:t>18.09.2022</a:t>
+              <a:t>30.07.25</a:t>
             </a:fld>
             <a:endParaRPr lang="de-DE"/>
           </a:p>
@@ -4046,7 +4046,7 @@
           <p:nvPr>
             <p:extLst>
               <p:ext uri="{D42A27DB-BD31-4B8C-83A1-F6EECF244321}">
-                <p14:modId xmlns:p14="http://schemas.microsoft.com/office/powerpoint/2010/main" val="3433788707"/>
+                <p14:modId xmlns:p14="http://schemas.microsoft.com/office/powerpoint/2010/main" val="3644215255"/>
               </p:ext>
             </p:extLst>
           </p:nvPr>
@@ -4110,7 +4110,7 @@
                         <a:buNone/>
                       </a:pPr>
                       <a:r>
-                        <a:rPr lang="de-DE" sz="1800" b="1" i="0" u="none" strike="noStrike" noProof="0">
+                        <a:rPr lang="de-DE" sz="1800" b="1" i="0" u="none" strike="noStrike" noProof="0" dirty="0">
                           <a:solidFill>
                             <a:schemeClr val="bg1"/>
                           </a:solidFill>
@@ -4118,12 +4118,12 @@
                         </a:rPr>
                         <a:t>Ermittlung Haltestellenkategorie</a:t>
                       </a:r>
-                      <a:endParaRPr lang="de-DE" sz="1800" b="0" i="0" u="none" strike="noStrike" noProof="0"/>
-                    </a:p>
-                  </a:txBody>
-                  <a:tcPr>
-                    <a:solidFill>
-                      <a:schemeClr val="tx2"/>
+                      <a:endParaRPr lang="de-DE" sz="1800" b="0" i="0" u="none" strike="noStrike" noProof="0" dirty="0"/>
+                    </a:p>
+                  </a:txBody>
+                  <a:tcPr>
+                    <a:solidFill>
+                      <a:srgbClr val="283647"/>
                     </a:solidFill>
                   </a:tcPr>
                 </a:tc>
@@ -4182,7 +4182,7 @@
                     <a:lstStyle/>
                     <a:p>
                       <a:r>
-                        <a:rPr lang="de-DE">
+                        <a:rPr lang="de-DE" dirty="0">
                           <a:solidFill>
                             <a:schemeClr val="bg1"/>
                           </a:solidFill>
@@ -4194,17 +4194,17 @@
                   </a:txBody>
                   <a:tcPr>
                     <a:solidFill>
-                      <a:schemeClr val="tx2"/>
-                    </a:solidFill>
-                  </a:tcPr>
-                </a:tc>
-                <a:tc>
-                  <a:txBody>
-                    <a:bodyPr/>
-                    <a:lstStyle/>
-                    <a:p>
-                      <a:r>
-                        <a:rPr lang="de-DE">
+                      <a:srgbClr val="283647"/>
+                    </a:solidFill>
+                  </a:tcPr>
+                </a:tc>
+                <a:tc>
+                  <a:txBody>
+                    <a:bodyPr/>
+                    <a:lstStyle/>
+                    <a:p>
+                      <a:r>
+                        <a:rPr lang="de-DE" dirty="0">
                           <a:solidFill>
                             <a:schemeClr val="bg1"/>
                           </a:solidFill>
@@ -4218,7 +4218,7 @@
                         <a:buNone/>
                       </a:pPr>
                       <a:r>
-                        <a:rPr lang="de-DE">
+                        <a:rPr lang="de-DE" dirty="0">
                           <a:solidFill>
                             <a:schemeClr val="bg1"/>
                           </a:solidFill>
@@ -4232,7 +4232,7 @@
                         <a:buNone/>
                       </a:pPr>
                       <a:r>
-                        <a:rPr lang="de-DE">
+                        <a:rPr lang="de-DE" dirty="0">
                           <a:solidFill>
                             <a:schemeClr val="bg1"/>
                           </a:solidFill>
@@ -4244,17 +4244,17 @@
                   </a:txBody>
                   <a:tcPr>
                     <a:solidFill>
-                      <a:schemeClr val="tx2"/>
-                    </a:solidFill>
-                  </a:tcPr>
-                </a:tc>
-                <a:tc>
-                  <a:txBody>
-                    <a:bodyPr/>
-                    <a:lstStyle/>
-                    <a:p>
-                      <a:r>
-                        <a:rPr lang="de-DE">
+                      <a:srgbClr val="283647"/>
+                    </a:solidFill>
+                  </a:tcPr>
+                </a:tc>
+                <a:tc>
+                  <a:txBody>
+                    <a:bodyPr/>
+                    <a:lstStyle/>
+                    <a:p>
+                      <a:r>
+                        <a:rPr lang="de-DE" dirty="0">
                           <a:solidFill>
                             <a:schemeClr val="bg1"/>
                           </a:solidFill>
@@ -4262,27 +4262,21 @@
                         </a:rPr>
                         <a:t>Straßenbahnhaltestelle</a:t>
                       </a:r>
-                      <a:endParaRPr lang="de-DE" err="1">
-                        <a:solidFill>
-                          <a:schemeClr val="bg1"/>
-                        </a:solidFill>
-                        <a:latin typeface="Mulish"/>
-                      </a:endParaRPr>
-                    </a:p>
-                  </a:txBody>
-                  <a:tcPr>
-                    <a:solidFill>
-                      <a:schemeClr val="tx2"/>
-                    </a:solidFill>
-                  </a:tcPr>
-                </a:tc>
-                <a:tc>
-                  <a:txBody>
-                    <a:bodyPr/>
-                    <a:lstStyle/>
-                    <a:p>
-                      <a:r>
-                        <a:rPr lang="de-DE">
+                    </a:p>
+                  </a:txBody>
+                  <a:tcPr>
+                    <a:solidFill>
+                      <a:srgbClr val="283647"/>
+                    </a:solidFill>
+                  </a:tcPr>
+                </a:tc>
+                <a:tc>
+                  <a:txBody>
+                    <a:bodyPr/>
+                    <a:lstStyle/>
+                    <a:p>
+                      <a:r>
+                        <a:rPr lang="de-DE" dirty="0">
                           <a:solidFill>
                             <a:schemeClr val="bg1"/>
                           </a:solidFill>
@@ -4294,7 +4288,7 @@
                   </a:txBody>
                   <a:tcPr>
                     <a:solidFill>
-                      <a:schemeClr val="tx2"/>
+                      <a:srgbClr val="283647"/>
                     </a:solidFill>
                   </a:tcPr>
                 </a:tc>
@@ -4438,7 +4432,7 @@
                     <a:p>
                       <a:pPr algn="ctr"/>
                       <a:r>
-                        <a:rPr lang="de-DE">
+                        <a:rPr lang="de-DE" dirty="0">
                           <a:latin typeface="Mulish"/>
                         </a:rPr>
                         <a:t>I</a:t>
@@ -4903,12 +4897,12 @@
                         <a:buNone/>
                       </a:pPr>
                       <a:r>
-                        <a:rPr lang="de-DE" sz="1800" b="0" i="0" u="none" strike="noStrike" noProof="0">
+                        <a:rPr lang="de-DE" sz="1800" b="0" i="0" u="none" strike="noStrike" noProof="0" dirty="0">
                           <a:latin typeface="Mulish"/>
                         </a:rPr>
                         <a:t>VII</a:t>
                       </a:r>
-                      <a:endParaRPr lang="de-DE">
+                      <a:endParaRPr lang="de-DE" dirty="0">
                         <a:latin typeface="Mulish"/>
                       </a:endParaRPr>
                     </a:p>
@@ -4974,7 +4968,7 @@
           <p:nvPr>
             <p:extLst>
               <p:ext uri="{D42A27DB-BD31-4B8C-83A1-F6EECF244321}">
-                <p14:modId xmlns:p14="http://schemas.microsoft.com/office/powerpoint/2010/main" val="1418426869"/>
+                <p14:modId xmlns:p14="http://schemas.microsoft.com/office/powerpoint/2010/main" val="2026386940"/>
               </p:ext>
             </p:extLst>
           </p:nvPr>
@@ -5074,7 +5068,7 @@
                   </a:txBody>
                   <a:tcPr>
                     <a:solidFill>
-                      <a:schemeClr val="tx2"/>
+                      <a:srgbClr val="283647"/>
                     </a:solidFill>
                   </a:tcPr>
                 </a:tc>
@@ -5151,7 +5145,7 @@
                   </a:txBody>
                   <a:tcPr>
                     <a:solidFill>
-                      <a:schemeClr val="tx2"/>
+                      <a:srgbClr val="283647"/>
                     </a:solidFill>
                   </a:tcPr>
                 </a:tc>
@@ -5164,47 +5158,110 @@
                         <a:buNone/>
                       </a:pPr>
                       <a:r>
-                        <a:rPr lang="de-DE">
+                        <a:rPr lang="de-DE" dirty="0">
                           <a:solidFill>
                             <a:schemeClr val="bg1"/>
                           </a:solidFill>
                           <a:latin typeface="Mulish"/>
                         </a:rPr>
-                        <a:t>Metro station</a:t>
-                      </a:r>
-                    </a:p>
-                    <a:p>
-                      <a:pPr lvl="0">
-                        <a:buNone/>
-                      </a:pPr>
-                      <a:r>
-                        <a:rPr lang="de-DE">
+                        <a:t>Metro </a:t>
+                      </a:r>
+                      <a:r>
+                        <a:rPr lang="de-DE" dirty="0" err="1">
                           <a:solidFill>
                             <a:schemeClr val="bg1"/>
                           </a:solidFill>
                           <a:latin typeface="Mulish"/>
                         </a:rPr>
-                        <a:t>Suburban rail station</a:t>
-                      </a:r>
+                        <a:t>station</a:t>
+                      </a:r>
+                      <a:endParaRPr lang="de-DE" dirty="0">
+                        <a:solidFill>
+                          <a:schemeClr val="bg1"/>
+                        </a:solidFill>
+                        <a:latin typeface="Mulish"/>
+                      </a:endParaRPr>
                     </a:p>
                     <a:p>
                       <a:pPr lvl="0">
                         <a:buNone/>
                       </a:pPr>
                       <a:r>
-                        <a:rPr lang="de-DE">
+                        <a:rPr lang="de-DE" dirty="0">
                           <a:solidFill>
                             <a:schemeClr val="bg1"/>
                           </a:solidFill>
                           <a:latin typeface="Mulish"/>
                         </a:rPr>
-                        <a:t>Rail station</a:t>
-                      </a:r>
-                    </a:p>
-                  </a:txBody>
-                  <a:tcPr>
-                    <a:solidFill>
-                      <a:schemeClr val="tx2"/>
+                        <a:t>Suburban </a:t>
+                      </a:r>
+                      <a:r>
+                        <a:rPr lang="de-DE" dirty="0" err="1">
+                          <a:solidFill>
+                            <a:schemeClr val="bg1"/>
+                          </a:solidFill>
+                          <a:latin typeface="Mulish"/>
+                        </a:rPr>
+                        <a:t>rail</a:t>
+                      </a:r>
+                      <a:r>
+                        <a:rPr lang="de-DE" dirty="0">
+                          <a:solidFill>
+                            <a:schemeClr val="bg1"/>
+                          </a:solidFill>
+                          <a:latin typeface="Mulish"/>
+                        </a:rPr>
+                        <a:t> </a:t>
+                      </a:r>
+                      <a:r>
+                        <a:rPr lang="de-DE" dirty="0" err="1">
+                          <a:solidFill>
+                            <a:schemeClr val="bg1"/>
+                          </a:solidFill>
+                          <a:latin typeface="Mulish"/>
+                        </a:rPr>
+                        <a:t>station</a:t>
+                      </a:r>
+                      <a:endParaRPr lang="de-DE" dirty="0">
+                        <a:solidFill>
+                          <a:schemeClr val="bg1"/>
+                        </a:solidFill>
+                        <a:latin typeface="Mulish"/>
+                      </a:endParaRPr>
+                    </a:p>
+                    <a:p>
+                      <a:pPr lvl="0">
+                        <a:buNone/>
+                      </a:pPr>
+                      <a:r>
+                        <a:rPr lang="de-DE" dirty="0">
+                          <a:solidFill>
+                            <a:schemeClr val="bg1"/>
+                          </a:solidFill>
+                          <a:latin typeface="Mulish"/>
+                        </a:rPr>
+                        <a:t>Rail </a:t>
+                      </a:r>
+                      <a:r>
+                        <a:rPr lang="de-DE" dirty="0" err="1">
+                          <a:solidFill>
+                            <a:schemeClr val="bg1"/>
+                          </a:solidFill>
+                          <a:latin typeface="Mulish"/>
+                        </a:rPr>
+                        <a:t>station</a:t>
+                      </a:r>
+                      <a:endParaRPr lang="de-DE" dirty="0">
+                        <a:solidFill>
+                          <a:schemeClr val="bg1"/>
+                        </a:solidFill>
+                        <a:latin typeface="Mulish"/>
+                      </a:endParaRPr>
+                    </a:p>
+                  </a:txBody>
+                  <a:tcPr>
+                    <a:solidFill>
+                      <a:srgbClr val="283647"/>
                     </a:solidFill>
                   </a:tcPr>
                 </a:tc>
@@ -5234,7 +5291,7 @@
                   </a:txBody>
                   <a:tcPr>
                     <a:solidFill>
-                      <a:schemeClr val="tx2"/>
+                      <a:srgbClr val="283647"/>
                     </a:solidFill>
                   </a:tcPr>
                 </a:tc>
@@ -5247,15 +5304,24 @@
                         <a:buNone/>
                       </a:pPr>
                       <a:r>
-                        <a:rPr lang="de-DE">
+                        <a:rPr lang="de-DE" dirty="0">
                           <a:solidFill>
                             <a:schemeClr val="bg1"/>
                           </a:solidFill>
                           <a:latin typeface="Mulish"/>
                         </a:rPr>
-                        <a:t>Bus station</a:t>
-                      </a:r>
-                      <a:endParaRPr lang="de-DE" err="1">
+                        <a:t>Bus </a:t>
+                      </a:r>
+                      <a:r>
+                        <a:rPr lang="de-DE" dirty="0" err="1">
+                          <a:solidFill>
+                            <a:schemeClr val="bg1"/>
+                          </a:solidFill>
+                          <a:latin typeface="Mulish"/>
+                        </a:rPr>
+                        <a:t>station</a:t>
+                      </a:r>
+                      <a:endParaRPr lang="de-DE" dirty="0">
                         <a:solidFill>
                           <a:schemeClr val="bg1"/>
                         </a:solidFill>
@@ -5265,7 +5331,7 @@
                   </a:txBody>
                   <a:tcPr>
                     <a:solidFill>
-                      <a:schemeClr val="tx2"/>
+                      <a:srgbClr val="283647"/>
                     </a:solidFill>
                   </a:tcPr>
                 </a:tc>
@@ -5282,12 +5348,18 @@
                     <a:lstStyle/>
                     <a:p>
                       <a:r>
-                        <a:rPr lang="de-DE">
-                          <a:latin typeface="Mulish"/>
-                        </a:rPr>
-                        <a:t>&lt; 5 minutes</a:t>
-                      </a:r>
-                      <a:endParaRPr lang="de-DE" err="1">
+                        <a:rPr lang="de-DE" dirty="0">
+                          <a:latin typeface="Mulish"/>
+                        </a:rPr>
+                        <a:t>&lt; 5 </a:t>
+                      </a:r>
+                      <a:r>
+                        <a:rPr lang="de-DE" dirty="0" err="1">
+                          <a:latin typeface="Mulish"/>
+                        </a:rPr>
+                        <a:t>minutes</a:t>
+                      </a:r>
+                      <a:endParaRPr lang="de-DE" dirty="0">
                         <a:latin typeface="Mulish"/>
                       </a:endParaRPr>
                     </a:p>
@@ -5308,7 +5380,7 @@
                     <a:p>
                       <a:pPr algn="ctr"/>
                       <a:r>
-                        <a:rPr lang="de-DE">
+                        <a:rPr lang="de-DE" dirty="0">
                           <a:latin typeface="Mulish"/>
                         </a:rPr>
                         <a:t>I</a:t>
@@ -5331,7 +5403,7 @@
                     <a:p>
                       <a:pPr algn="ctr"/>
                       <a:r>
-                        <a:rPr lang="de-DE">
+                        <a:rPr lang="de-DE" dirty="0">
                           <a:latin typeface="Mulish"/>
                         </a:rPr>
                         <a:t>I</a:t>
@@ -5354,7 +5426,7 @@
                     <a:p>
                       <a:pPr algn="ctr"/>
                       <a:r>
-                        <a:rPr lang="de-DE">
+                        <a:rPr lang="de-DE" dirty="0">
                           <a:latin typeface="Mulish"/>
                         </a:rPr>
                         <a:t>II</a:t>
@@ -5886,12 +5958,12 @@
                         <a:buNone/>
                       </a:pPr>
                       <a:r>
-                        <a:rPr lang="de-DE" sz="1800" b="0" i="0" u="none" strike="noStrike" noProof="0">
+                        <a:rPr lang="de-DE" sz="1800" b="0" i="0" u="none" strike="noStrike" noProof="0" dirty="0">
                           <a:latin typeface="Mulish"/>
                         </a:rPr>
                         <a:t>VII</a:t>
                       </a:r>
-                      <a:endParaRPr lang="de-DE">
+                      <a:endParaRPr lang="de-DE" dirty="0">
                         <a:latin typeface="Mulish"/>
                       </a:endParaRPr>
                     </a:p>
@@ -5957,7 +6029,7 @@
           <p:nvPr>
             <p:extLst>
               <p:ext uri="{D42A27DB-BD31-4B8C-83A1-F6EECF244321}">
-                <p14:modId xmlns:p14="http://schemas.microsoft.com/office/powerpoint/2010/main" val="824661121"/>
+                <p14:modId xmlns:p14="http://schemas.microsoft.com/office/powerpoint/2010/main" val="2888710758"/>
               </p:ext>
             </p:extLst>
           </p:nvPr>
@@ -6019,19 +6091,22 @@
                         <a:buNone/>
                       </a:pPr>
                       <a:r>
-                        <a:rPr lang="de-DE">
-                          <a:latin typeface="Mulish"/>
-                        </a:rPr>
-                        <a:t>Kategorie</a:t>
-                      </a:r>
-                      <a:endParaRPr lang="de-DE" err="1">
+                        <a:rPr lang="de-DE" sz="1800" b="1" i="0" u="none" strike="noStrike" noProof="0" dirty="0">
+                          <a:solidFill>
+                            <a:schemeClr val="bg1"/>
+                          </a:solidFill>
+                          <a:latin typeface="Mulish"/>
+                        </a:rPr>
+                        <a:t>Haltestellenkategorie</a:t>
+                      </a:r>
+                      <a:endParaRPr lang="de-DE" dirty="0">
                         <a:latin typeface="Mulish"/>
                       </a:endParaRPr>
                     </a:p>
                   </a:txBody>
                   <a:tcPr>
                     <a:solidFill>
-                      <a:schemeClr val="tx2"/>
+                      <a:srgbClr val="283647"/>
                     </a:solidFill>
                   </a:tcPr>
                 </a:tc>
@@ -6042,7 +6117,7 @@
                     <a:p>
                       <a:pPr algn="ctr"/>
                       <a:r>
-                        <a:rPr lang="de-DE">
+                        <a:rPr lang="de-DE" dirty="0">
                           <a:latin typeface="Mulish"/>
                         </a:rPr>
                         <a:t>&lt; 300m</a:t>
@@ -6051,7 +6126,7 @@
                   </a:txBody>
                   <a:tcPr>
                     <a:solidFill>
-                      <a:schemeClr val="tx2"/>
+                      <a:srgbClr val="283647"/>
                     </a:solidFill>
                   </a:tcPr>
                 </a:tc>
@@ -6064,7 +6139,7 @@
                         <a:buNone/>
                       </a:pPr>
                       <a:r>
-                        <a:rPr lang="de-DE">
+                        <a:rPr lang="de-DE" dirty="0">
                           <a:latin typeface="Mulish"/>
                         </a:rPr>
                         <a:t>300-500m</a:t>
@@ -6073,7 +6148,7 @@
                   </a:txBody>
                   <a:tcPr>
                     <a:solidFill>
-                      <a:schemeClr val="tx2"/>
+                      <a:srgbClr val="283647"/>
                     </a:solidFill>
                   </a:tcPr>
                 </a:tc>
@@ -6086,7 +6161,7 @@
                         <a:buNone/>
                       </a:pPr>
                       <a:r>
-                        <a:rPr lang="de-DE">
+                        <a:rPr lang="de-DE" dirty="0">
                           <a:latin typeface="Mulish"/>
                         </a:rPr>
                         <a:t>501-750m</a:t>
@@ -6095,7 +6170,7 @@
                   </a:txBody>
                   <a:tcPr>
                     <a:solidFill>
-                      <a:schemeClr val="tx2"/>
+                      <a:srgbClr val="283647"/>
                     </a:solidFill>
                   </a:tcPr>
                 </a:tc>
@@ -6108,7 +6183,7 @@
                         <a:buNone/>
                       </a:pPr>
                       <a:r>
-                        <a:rPr lang="de-DE">
+                        <a:rPr lang="de-DE" dirty="0">
                           <a:latin typeface="Mulish"/>
                         </a:rPr>
                         <a:t>751-1000m</a:t>
@@ -6117,7 +6192,7 @@
                   </a:txBody>
                   <a:tcPr>
                     <a:solidFill>
-                      <a:schemeClr val="tx2"/>
+                      <a:srgbClr val="283647"/>
                     </a:solidFill>
                   </a:tcPr>
                 </a:tc>
@@ -6963,7 +7038,7 @@
                         <a:buNone/>
                       </a:pPr>
                       <a:r>
-                        <a:rPr lang="de-DE" sz="1800" b="0" i="0" u="none" strike="noStrike" noProof="0">
+                        <a:rPr lang="de-DE" sz="1800" b="0" i="0" u="none" strike="noStrike" noProof="0" dirty="0">
                           <a:latin typeface="Mulish"/>
                         </a:rPr>
                         <a:t>-</a:t>
@@ -7031,7 +7106,7 @@
           <p:nvPr>
             <p:extLst>
               <p:ext uri="{D42A27DB-BD31-4B8C-83A1-F6EECF244321}">
-                <p14:modId xmlns:p14="http://schemas.microsoft.com/office/powerpoint/2010/main" val="448397375"/>
+                <p14:modId xmlns:p14="http://schemas.microsoft.com/office/powerpoint/2010/main" val="671917116"/>
               </p:ext>
             </p:extLst>
           </p:nvPr>
@@ -7093,19 +7168,25 @@
                         <a:buNone/>
                       </a:pPr>
                       <a:r>
-                        <a:rPr lang="de-DE" err="1">
-                          <a:latin typeface="Mulish"/>
-                        </a:rPr>
-                        <a:t>Category</a:t>
-                      </a:r>
-                      <a:endParaRPr lang="de-DE">
+                        <a:rPr lang="de-DE" dirty="0">
+                          <a:latin typeface="Mulish"/>
+                        </a:rPr>
+                        <a:t>Station </a:t>
+                      </a:r>
+                      <a:r>
+                        <a:rPr lang="de-DE" dirty="0" err="1">
+                          <a:latin typeface="Mulish"/>
+                        </a:rPr>
+                        <a:t>category</a:t>
+                      </a:r>
+                      <a:endParaRPr lang="de-DE" dirty="0">
                         <a:latin typeface="Mulish"/>
                       </a:endParaRPr>
                     </a:p>
                   </a:txBody>
                   <a:tcPr>
                     <a:solidFill>
-                      <a:schemeClr val="tx2"/>
+                      <a:srgbClr val="283647"/>
                     </a:solidFill>
                   </a:tcPr>
                 </a:tc>
@@ -7116,7 +7197,7 @@
                     <a:p>
                       <a:pPr algn="ctr"/>
                       <a:r>
-                        <a:rPr lang="de-DE">
+                        <a:rPr lang="de-DE" dirty="0">
                           <a:latin typeface="Mulish"/>
                         </a:rPr>
                         <a:t>&lt; 300m</a:t>
@@ -7125,7 +7206,7 @@
                   </a:txBody>
                   <a:tcPr>
                     <a:solidFill>
-                      <a:schemeClr val="tx2"/>
+                      <a:srgbClr val="283647"/>
                     </a:solidFill>
                   </a:tcPr>
                 </a:tc>
@@ -7138,7 +7219,7 @@
                         <a:buNone/>
                       </a:pPr>
                       <a:r>
-                        <a:rPr lang="de-DE">
+                        <a:rPr lang="de-DE" dirty="0">
                           <a:latin typeface="Mulish"/>
                         </a:rPr>
                         <a:t>300-500m</a:t>
@@ -7147,7 +7228,7 @@
                   </a:txBody>
                   <a:tcPr>
                     <a:solidFill>
-                      <a:schemeClr val="tx2"/>
+                      <a:srgbClr val="283647"/>
                     </a:solidFill>
                   </a:tcPr>
                 </a:tc>
@@ -7160,7 +7241,7 @@
                         <a:buNone/>
                       </a:pPr>
                       <a:r>
-                        <a:rPr lang="de-DE">
+                        <a:rPr lang="de-DE" dirty="0">
                           <a:latin typeface="Mulish"/>
                         </a:rPr>
                         <a:t>501-750m</a:t>
@@ -7169,7 +7250,7 @@
                   </a:txBody>
                   <a:tcPr>
                     <a:solidFill>
-                      <a:schemeClr val="tx2"/>
+                      <a:srgbClr val="283647"/>
                     </a:solidFill>
                   </a:tcPr>
                 </a:tc>
@@ -7182,7 +7263,7 @@
                         <a:buNone/>
                       </a:pPr>
                       <a:r>
-                        <a:rPr lang="de-DE">
+                        <a:rPr lang="de-DE" dirty="0">
                           <a:latin typeface="Mulish"/>
                         </a:rPr>
                         <a:t>751-1000m</a:t>
@@ -7191,7 +7272,7 @@
                   </a:txBody>
                   <a:tcPr>
                     <a:solidFill>
-                      <a:schemeClr val="tx2"/>
+                      <a:srgbClr val="283647"/>
                     </a:solidFill>
                   </a:tcPr>
                 </a:tc>
@@ -7710,7 +7791,7 @@
                         <a:buNone/>
                       </a:pPr>
                       <a:r>
-                        <a:rPr lang="de-DE" b="0">
+                        <a:rPr lang="de-DE" b="0" dirty="0">
                           <a:latin typeface="Mulish"/>
                         </a:rPr>
                         <a:t>D</a:t>
@@ -8037,7 +8118,7 @@
                         <a:buNone/>
                       </a:pPr>
                       <a:r>
-                        <a:rPr lang="de-DE" sz="1800" b="0" i="0" u="none" strike="noStrike" noProof="0">
+                        <a:rPr lang="de-DE" sz="1800" b="0" i="0" u="none" strike="noStrike" noProof="0" dirty="0">
                           <a:latin typeface="Mulish"/>
                         </a:rPr>
                         <a:t>-</a:t>

</xml_diff>